<commit_message>
Change test case 1
</commit_message>
<xml_diff>
--- a/architecture.pptx
+++ b/architecture.pptx
@@ -6,6 +6,7 @@
   </p:sldMasterIdLst>
   <p:sldIdLst>
     <p:sldId id="256" r:id="rId2"/>
+    <p:sldId id="257" r:id="rId3"/>
   </p:sldIdLst>
   <p:sldSz cx="12192000" cy="6858000"/>
   <p:notesSz cx="6858000" cy="9144000"/>
@@ -104,6 +105,11 @@
       </a:defRPr>
     </a:lvl9pPr>
   </p:defaultTextStyle>
+  <p:extLst>
+    <p:ext uri="{EFAFB233-063F-42B5-8137-9DF3F51BA10A}">
+      <p15:sldGuideLst xmlns:p15="http://schemas.microsoft.com/office/powerpoint/2012/main"/>
+    </p:ext>
+  </p:extLst>
 </p:presentation>
 </file>
 
@@ -254,7 +260,7 @@
           <a:p>
             <a:fld id="{EBAE0DFD-7312-9144-8250-D29833609FD2}" type="datetimeFigureOut">
               <a:rPr lang="en-US" smtClean="0"/>
-              <a:t>6/28/23</a:t>
+              <a:t>7/3/23</a:t>
             </a:fld>
             <a:endParaRPr lang="en-US"/>
           </a:p>
@@ -452,7 +458,7 @@
           <a:p>
             <a:fld id="{EBAE0DFD-7312-9144-8250-D29833609FD2}" type="datetimeFigureOut">
               <a:rPr lang="en-US" smtClean="0"/>
-              <a:t>6/28/23</a:t>
+              <a:t>7/3/23</a:t>
             </a:fld>
             <a:endParaRPr lang="en-US"/>
           </a:p>
@@ -660,7 +666,7 @@
           <a:p>
             <a:fld id="{EBAE0DFD-7312-9144-8250-D29833609FD2}" type="datetimeFigureOut">
               <a:rPr lang="en-US" smtClean="0"/>
-              <a:t>6/28/23</a:t>
+              <a:t>7/3/23</a:t>
             </a:fld>
             <a:endParaRPr lang="en-US"/>
           </a:p>
@@ -858,7 +864,7 @@
           <a:p>
             <a:fld id="{EBAE0DFD-7312-9144-8250-D29833609FD2}" type="datetimeFigureOut">
               <a:rPr lang="en-US" smtClean="0"/>
-              <a:t>6/28/23</a:t>
+              <a:t>7/3/23</a:t>
             </a:fld>
             <a:endParaRPr lang="en-US"/>
           </a:p>
@@ -1133,7 +1139,7 @@
           <a:p>
             <a:fld id="{EBAE0DFD-7312-9144-8250-D29833609FD2}" type="datetimeFigureOut">
               <a:rPr lang="en-US" smtClean="0"/>
-              <a:t>6/28/23</a:t>
+              <a:t>7/3/23</a:t>
             </a:fld>
             <a:endParaRPr lang="en-US"/>
           </a:p>
@@ -1398,7 +1404,7 @@
           <a:p>
             <a:fld id="{EBAE0DFD-7312-9144-8250-D29833609FD2}" type="datetimeFigureOut">
               <a:rPr lang="en-US" smtClean="0"/>
-              <a:t>6/28/23</a:t>
+              <a:t>7/3/23</a:t>
             </a:fld>
             <a:endParaRPr lang="en-US"/>
           </a:p>
@@ -1810,7 +1816,7 @@
           <a:p>
             <a:fld id="{EBAE0DFD-7312-9144-8250-D29833609FD2}" type="datetimeFigureOut">
               <a:rPr lang="en-US" smtClean="0"/>
-              <a:t>6/28/23</a:t>
+              <a:t>7/3/23</a:t>
             </a:fld>
             <a:endParaRPr lang="en-US"/>
           </a:p>
@@ -1951,7 +1957,7 @@
           <a:p>
             <a:fld id="{EBAE0DFD-7312-9144-8250-D29833609FD2}" type="datetimeFigureOut">
               <a:rPr lang="en-US" smtClean="0"/>
-              <a:t>6/28/23</a:t>
+              <a:t>7/3/23</a:t>
             </a:fld>
             <a:endParaRPr lang="en-US"/>
           </a:p>
@@ -2064,7 +2070,7 @@
           <a:p>
             <a:fld id="{EBAE0DFD-7312-9144-8250-D29833609FD2}" type="datetimeFigureOut">
               <a:rPr lang="en-US" smtClean="0"/>
-              <a:t>6/28/23</a:t>
+              <a:t>7/3/23</a:t>
             </a:fld>
             <a:endParaRPr lang="en-US"/>
           </a:p>
@@ -2375,7 +2381,7 @@
           <a:p>
             <a:fld id="{EBAE0DFD-7312-9144-8250-D29833609FD2}" type="datetimeFigureOut">
               <a:rPr lang="en-US" smtClean="0"/>
-              <a:t>6/28/23</a:t>
+              <a:t>7/3/23</a:t>
             </a:fld>
             <a:endParaRPr lang="en-US"/>
           </a:p>
@@ -2663,7 +2669,7 @@
           <a:p>
             <a:fld id="{EBAE0DFD-7312-9144-8250-D29833609FD2}" type="datetimeFigureOut">
               <a:rPr lang="en-US" smtClean="0"/>
-              <a:t>6/28/23</a:t>
+              <a:t>7/3/23</a:t>
             </a:fld>
             <a:endParaRPr lang="en-US"/>
           </a:p>
@@ -2904,7 +2910,7 @@
           <a:p>
             <a:fld id="{EBAE0DFD-7312-9144-8250-D29833609FD2}" type="datetimeFigureOut">
               <a:rPr lang="en-US" smtClean="0"/>
-              <a:t>6/28/23</a:t>
+              <a:t>7/3/23</a:t>
             </a:fld>
             <a:endParaRPr lang="en-US"/>
           </a:p>
@@ -7971,6 +7977,1305 @@
 </p:sld>
 </file>
 
+<file path=ppt/slides/slide2.xml><?xml version="1.0" encoding="utf-8"?>
+<p:sld xmlns:a="http://schemas.openxmlformats.org/drawingml/2006/main" xmlns:r="http://schemas.openxmlformats.org/officeDocument/2006/relationships" xmlns:p="http://schemas.openxmlformats.org/presentationml/2006/main">
+  <p:cSld>
+    <p:spTree>
+      <p:nvGrpSpPr>
+        <p:cNvPr id="1" name=""/>
+        <p:cNvGrpSpPr/>
+        <p:nvPr/>
+      </p:nvGrpSpPr>
+      <p:grpSpPr>
+        <a:xfrm>
+          <a:off x="0" y="0"/>
+          <a:ext cx="0" cy="0"/>
+          <a:chOff x="0" y="0"/>
+          <a:chExt cx="0" cy="0"/>
+        </a:xfrm>
+      </p:grpSpPr>
+      <p:grpSp>
+        <p:nvGrpSpPr>
+          <p:cNvPr id="36" name="Group 35">
+            <a:extLst>
+              <a:ext uri="{FF2B5EF4-FFF2-40B4-BE49-F238E27FC236}">
+                <a16:creationId xmlns:a16="http://schemas.microsoft.com/office/drawing/2014/main" id="{B38EEDBF-A6C0-EA5A-5861-87B6B04EE0A9}"/>
+              </a:ext>
+            </a:extLst>
+          </p:cNvPr>
+          <p:cNvGrpSpPr/>
+          <p:nvPr/>
+        </p:nvGrpSpPr>
+        <p:grpSpPr>
+          <a:xfrm>
+            <a:off x="610061" y="1703301"/>
+            <a:ext cx="2081467" cy="1371806"/>
+            <a:chOff x="9410350" y="5520748"/>
+            <a:chExt cx="2081467" cy="1371806"/>
+          </a:xfrm>
+        </p:grpSpPr>
+        <p:sp>
+          <p:nvSpPr>
+            <p:cNvPr id="16" name="Rectangle 15">
+              <a:extLst>
+                <a:ext uri="{FF2B5EF4-FFF2-40B4-BE49-F238E27FC236}">
+                  <a16:creationId xmlns:a16="http://schemas.microsoft.com/office/drawing/2014/main" id="{FE807B38-A944-323E-C439-73F2895D5527}"/>
+                </a:ext>
+              </a:extLst>
+            </p:cNvPr>
+            <p:cNvSpPr/>
+            <p:nvPr/>
+          </p:nvSpPr>
+          <p:spPr>
+            <a:xfrm>
+              <a:off x="9410350" y="5520748"/>
+              <a:ext cx="2081467" cy="1371806"/>
+            </a:xfrm>
+            <a:prstGeom prst="rect">
+              <a:avLst/>
+            </a:prstGeom>
+            <a:solidFill>
+              <a:srgbClr val="1D8900">
+                <a:alpha val="9804"/>
+              </a:srgbClr>
+            </a:solidFill>
+            <a:ln w="12700">
+              <a:noFill/>
+              <a:prstDash val="dash"/>
+            </a:ln>
+          </p:spPr>
+          <p:style>
+            <a:lnRef idx="2">
+              <a:schemeClr val="accent1">
+                <a:shade val="50000"/>
+              </a:schemeClr>
+            </a:lnRef>
+            <a:fillRef idx="1">
+              <a:schemeClr val="accent1"/>
+            </a:fillRef>
+            <a:effectRef idx="0">
+              <a:schemeClr val="accent1"/>
+            </a:effectRef>
+            <a:fontRef idx="minor">
+              <a:schemeClr val="lt1"/>
+            </a:fontRef>
+          </p:style>
+          <p:txBody>
+            <a:bodyPr lIns="502920"/>
+            <a:lstStyle/>
+            <a:p>
+              <a:pPr eaLnBrk="1" fontAlgn="auto" hangingPunct="1">
+                <a:spcBef>
+                  <a:spcPts val="0"/>
+                </a:spcBef>
+                <a:spcAft>
+                  <a:spcPts val="0"/>
+                </a:spcAft>
+                <a:defRPr/>
+              </a:pPr>
+              <a:r>
+                <a:rPr lang="en-US" sz="1200" dirty="0">
+                  <a:solidFill>
+                    <a:srgbClr val="1E8900"/>
+                  </a:solidFill>
+                  <a:latin typeface="Arial" panose="020B0604020202020204" pitchFamily="34" charset="0"/>
+                  <a:cs typeface="Arial" panose="020B0604020202020204" pitchFamily="34" charset="0"/>
+                </a:rPr>
+                <a:t>Public subnet</a:t>
+              </a:r>
+            </a:p>
+          </p:txBody>
+        </p:sp>
+        <p:pic>
+          <p:nvPicPr>
+            <p:cNvPr id="18" name="Graphic 17">
+              <a:extLst>
+                <a:ext uri="{FF2B5EF4-FFF2-40B4-BE49-F238E27FC236}">
+                  <a16:creationId xmlns:a16="http://schemas.microsoft.com/office/drawing/2014/main" id="{CFF7B4D1-8DB0-354D-23D0-797F4D857FE0}"/>
+                </a:ext>
+              </a:extLst>
+            </p:cNvPr>
+            <p:cNvPicPr>
+              <a:picLocks noChangeAspect="1"/>
+            </p:cNvPicPr>
+            <p:nvPr/>
+          </p:nvPicPr>
+          <p:blipFill>
+            <a:blip r:embed="rId2">
+              <a:extLst>
+                <a:ext uri="{96DAC541-7B7A-43D3-8B79-37D633B846F1}">
+                  <asvg:svgBlip xmlns:asvg="http://schemas.microsoft.com/office/drawing/2016/SVG/main" r:embed="rId3"/>
+                </a:ext>
+              </a:extLst>
+            </a:blip>
+            <a:stretch>
+              <a:fillRect/>
+            </a:stretch>
+          </p:blipFill>
+          <p:spPr>
+            <a:xfrm>
+              <a:off x="9410986" y="5522336"/>
+              <a:ext cx="381000" cy="381000"/>
+            </a:xfrm>
+            <a:prstGeom prst="rect">
+              <a:avLst/>
+            </a:prstGeom>
+          </p:spPr>
+        </p:pic>
+      </p:grpSp>
+      <p:grpSp>
+        <p:nvGrpSpPr>
+          <p:cNvPr id="35" name="Group 34">
+            <a:extLst>
+              <a:ext uri="{FF2B5EF4-FFF2-40B4-BE49-F238E27FC236}">
+                <a16:creationId xmlns:a16="http://schemas.microsoft.com/office/drawing/2014/main" id="{95853BB1-1996-1CEF-DAD2-5A83B784FF3A}"/>
+              </a:ext>
+            </a:extLst>
+          </p:cNvPr>
+          <p:cNvGrpSpPr/>
+          <p:nvPr/>
+        </p:nvGrpSpPr>
+        <p:grpSpPr>
+          <a:xfrm>
+            <a:off x="611434" y="3135085"/>
+            <a:ext cx="2080094" cy="1371806"/>
+            <a:chOff x="7463283" y="5520748"/>
+            <a:chExt cx="2080094" cy="1371806"/>
+          </a:xfrm>
+        </p:grpSpPr>
+        <p:sp>
+          <p:nvSpPr>
+            <p:cNvPr id="14" name="Rectangle 13">
+              <a:extLst>
+                <a:ext uri="{FF2B5EF4-FFF2-40B4-BE49-F238E27FC236}">
+                  <a16:creationId xmlns:a16="http://schemas.microsoft.com/office/drawing/2014/main" id="{4297EE51-1F7C-3FC6-673C-639A999EA654}"/>
+                </a:ext>
+              </a:extLst>
+            </p:cNvPr>
+            <p:cNvSpPr/>
+            <p:nvPr/>
+          </p:nvSpPr>
+          <p:spPr>
+            <a:xfrm>
+              <a:off x="7463283" y="5520748"/>
+              <a:ext cx="2080094" cy="1371806"/>
+            </a:xfrm>
+            <a:prstGeom prst="rect">
+              <a:avLst/>
+            </a:prstGeom>
+            <a:solidFill>
+              <a:srgbClr val="007CBC">
+                <a:alpha val="9804"/>
+              </a:srgbClr>
+            </a:solidFill>
+            <a:ln w="12700">
+              <a:noFill/>
+              <a:prstDash val="dash"/>
+            </a:ln>
+          </p:spPr>
+          <p:style>
+            <a:lnRef idx="2">
+              <a:schemeClr val="accent1">
+                <a:shade val="50000"/>
+              </a:schemeClr>
+            </a:lnRef>
+            <a:fillRef idx="1">
+              <a:schemeClr val="accent1"/>
+            </a:fillRef>
+            <a:effectRef idx="0">
+              <a:schemeClr val="accent1"/>
+            </a:effectRef>
+            <a:fontRef idx="minor">
+              <a:schemeClr val="lt1"/>
+            </a:fontRef>
+          </p:style>
+          <p:txBody>
+            <a:bodyPr lIns="502920"/>
+            <a:lstStyle/>
+            <a:p>
+              <a:pPr eaLnBrk="1" fontAlgn="auto" hangingPunct="1">
+                <a:spcBef>
+                  <a:spcPts val="0"/>
+                </a:spcBef>
+                <a:spcAft>
+                  <a:spcPts val="0"/>
+                </a:spcAft>
+                <a:defRPr/>
+              </a:pPr>
+              <a:r>
+                <a:rPr lang="en-US" sz="1200" dirty="0">
+                  <a:solidFill>
+                    <a:srgbClr val="5B9CD5"/>
+                  </a:solidFill>
+                  <a:latin typeface="Arial" panose="020B0604020202020204" pitchFamily="34" charset="0"/>
+                  <a:cs typeface="Arial" panose="020B0604020202020204" pitchFamily="34" charset="0"/>
+                </a:rPr>
+                <a:t>Private subnet</a:t>
+              </a:r>
+            </a:p>
+          </p:txBody>
+        </p:sp>
+        <p:pic>
+          <p:nvPicPr>
+            <p:cNvPr id="19" name="Graphic 18">
+              <a:extLst>
+                <a:ext uri="{FF2B5EF4-FFF2-40B4-BE49-F238E27FC236}">
+                  <a16:creationId xmlns:a16="http://schemas.microsoft.com/office/drawing/2014/main" id="{1944EB5B-CAEE-B3DC-F0BE-0AFAB661AC99}"/>
+                </a:ext>
+              </a:extLst>
+            </p:cNvPr>
+            <p:cNvPicPr>
+              <a:picLocks noChangeAspect="1"/>
+            </p:cNvPicPr>
+            <p:nvPr/>
+          </p:nvPicPr>
+          <p:blipFill>
+            <a:blip r:embed="rId4">
+              <a:extLst>
+                <a:ext uri="{96DAC541-7B7A-43D3-8B79-37D633B846F1}">
+                  <asvg:svgBlip xmlns:asvg="http://schemas.microsoft.com/office/drawing/2016/SVG/main" r:embed="rId5"/>
+                </a:ext>
+              </a:extLst>
+            </a:blip>
+            <a:stretch>
+              <a:fillRect/>
+            </a:stretch>
+          </p:blipFill>
+          <p:spPr>
+            <a:xfrm>
+              <a:off x="7468045" y="5522336"/>
+              <a:ext cx="381000" cy="381000"/>
+            </a:xfrm>
+            <a:prstGeom prst="rect">
+              <a:avLst/>
+            </a:prstGeom>
+          </p:spPr>
+        </p:pic>
+      </p:grpSp>
+      <p:grpSp>
+        <p:nvGrpSpPr>
+          <p:cNvPr id="34" name="Group 33">
+            <a:extLst>
+              <a:ext uri="{FF2B5EF4-FFF2-40B4-BE49-F238E27FC236}">
+                <a16:creationId xmlns:a16="http://schemas.microsoft.com/office/drawing/2014/main" id="{32AD1FD4-B66D-2BED-FE99-5249EDF2FE2C}"/>
+              </a:ext>
+            </a:extLst>
+          </p:cNvPr>
+          <p:cNvGrpSpPr/>
+          <p:nvPr/>
+        </p:nvGrpSpPr>
+        <p:grpSpPr>
+          <a:xfrm>
+            <a:off x="324608" y="442836"/>
+            <a:ext cx="11114723" cy="5561782"/>
+            <a:chOff x="7467568" y="4415702"/>
+            <a:chExt cx="11114723" cy="5570056"/>
+          </a:xfrm>
+        </p:grpSpPr>
+        <p:sp>
+          <p:nvSpPr>
+            <p:cNvPr id="15" name="Rectangle 14">
+              <a:extLst>
+                <a:ext uri="{FF2B5EF4-FFF2-40B4-BE49-F238E27FC236}">
+                  <a16:creationId xmlns:a16="http://schemas.microsoft.com/office/drawing/2014/main" id="{652CB7BA-CB12-C710-654E-7F1F416C4102}"/>
+                </a:ext>
+              </a:extLst>
+            </p:cNvPr>
+            <p:cNvSpPr/>
+            <p:nvPr/>
+          </p:nvSpPr>
+          <p:spPr>
+            <a:xfrm>
+              <a:off x="7468045" y="4422195"/>
+              <a:ext cx="11114246" cy="5563563"/>
+            </a:xfrm>
+            <a:prstGeom prst="rect">
+              <a:avLst/>
+            </a:prstGeom>
+            <a:noFill/>
+            <a:ln w="12700">
+              <a:solidFill>
+                <a:srgbClr val="5B9CD5"/>
+              </a:solidFill>
+              <a:prstDash val="sysDash"/>
+            </a:ln>
+          </p:spPr>
+          <p:style>
+            <a:lnRef idx="2">
+              <a:schemeClr val="accent1">
+                <a:shade val="50000"/>
+              </a:schemeClr>
+            </a:lnRef>
+            <a:fillRef idx="1">
+              <a:schemeClr val="accent1"/>
+            </a:fillRef>
+            <a:effectRef idx="0">
+              <a:schemeClr val="accent1"/>
+            </a:effectRef>
+            <a:fontRef idx="minor">
+              <a:schemeClr val="lt1"/>
+            </a:fontRef>
+          </p:style>
+          <p:txBody>
+            <a:bodyPr lIns="502920" tIns="91440"/>
+            <a:lstStyle/>
+            <a:p>
+              <a:pPr eaLnBrk="1" fontAlgn="auto" hangingPunct="1">
+                <a:spcBef>
+                  <a:spcPts val="0"/>
+                </a:spcBef>
+                <a:spcAft>
+                  <a:spcPts val="0"/>
+                </a:spcAft>
+                <a:defRPr/>
+              </a:pPr>
+              <a:r>
+                <a:rPr lang="en-US" sz="1200" dirty="0">
+                  <a:solidFill>
+                    <a:srgbClr val="5B9CD5"/>
+                  </a:solidFill>
+                  <a:latin typeface="Arial" panose="020B0604020202020204" pitchFamily="34" charset="0"/>
+                  <a:cs typeface="Arial" panose="020B0604020202020204" pitchFamily="34" charset="0"/>
+                </a:rPr>
+                <a:t>Region</a:t>
+              </a:r>
+            </a:p>
+          </p:txBody>
+        </p:sp>
+        <p:pic>
+          <p:nvPicPr>
+            <p:cNvPr id="20" name="Graphic 19">
+              <a:extLst>
+                <a:ext uri="{FF2B5EF4-FFF2-40B4-BE49-F238E27FC236}">
+                  <a16:creationId xmlns:a16="http://schemas.microsoft.com/office/drawing/2014/main" id="{EF9E1ABF-18B4-7AB3-3EE3-7B871B834535}"/>
+                </a:ext>
+              </a:extLst>
+            </p:cNvPr>
+            <p:cNvPicPr>
+              <a:picLocks noChangeAspect="1"/>
+            </p:cNvPicPr>
+            <p:nvPr/>
+          </p:nvPicPr>
+          <p:blipFill>
+            <a:blip r:embed="rId6">
+              <a:extLst>
+                <a:ext uri="{96DAC541-7B7A-43D3-8B79-37D633B846F1}">
+                  <asvg:svgBlip xmlns:asvg="http://schemas.microsoft.com/office/drawing/2016/SVG/main" r:embed="rId7"/>
+                </a:ext>
+              </a:extLst>
+            </a:blip>
+            <a:stretch>
+              <a:fillRect/>
+            </a:stretch>
+          </p:blipFill>
+          <p:spPr>
+            <a:xfrm>
+              <a:off x="7467568" y="4415702"/>
+              <a:ext cx="381000" cy="381000"/>
+            </a:xfrm>
+            <a:prstGeom prst="rect">
+              <a:avLst/>
+            </a:prstGeom>
+          </p:spPr>
+        </p:pic>
+      </p:grpSp>
+      <p:grpSp>
+        <p:nvGrpSpPr>
+          <p:cNvPr id="29" name="Group 28">
+            <a:extLst>
+              <a:ext uri="{FF2B5EF4-FFF2-40B4-BE49-F238E27FC236}">
+                <a16:creationId xmlns:a16="http://schemas.microsoft.com/office/drawing/2014/main" id="{017B58D3-E533-E743-DE28-277C34102ED2}"/>
+              </a:ext>
+            </a:extLst>
+          </p:cNvPr>
+          <p:cNvGrpSpPr/>
+          <p:nvPr/>
+        </p:nvGrpSpPr>
+        <p:grpSpPr>
+          <a:xfrm>
+            <a:off x="400468" y="910167"/>
+            <a:ext cx="10656308" cy="5019806"/>
+            <a:chOff x="5529548" y="5520748"/>
+            <a:chExt cx="10656308" cy="5019806"/>
+          </a:xfrm>
+        </p:grpSpPr>
+        <p:sp>
+          <p:nvSpPr>
+            <p:cNvPr id="13" name="Rectangle 12">
+              <a:extLst>
+                <a:ext uri="{FF2B5EF4-FFF2-40B4-BE49-F238E27FC236}">
+                  <a16:creationId xmlns:a16="http://schemas.microsoft.com/office/drawing/2014/main" id="{09B9725C-D821-AF74-9B90-D7B190EBBF4C}"/>
+                </a:ext>
+              </a:extLst>
+            </p:cNvPr>
+            <p:cNvSpPr/>
+            <p:nvPr/>
+          </p:nvSpPr>
+          <p:spPr>
+            <a:xfrm>
+              <a:off x="5529548" y="5520748"/>
+              <a:ext cx="10656308" cy="5019806"/>
+            </a:xfrm>
+            <a:prstGeom prst="rect">
+              <a:avLst/>
+            </a:prstGeom>
+            <a:noFill/>
+            <a:ln w="12700">
+              <a:solidFill>
+                <a:srgbClr val="1E8900"/>
+              </a:solidFill>
+            </a:ln>
+          </p:spPr>
+          <p:style>
+            <a:lnRef idx="2">
+              <a:schemeClr val="accent1">
+                <a:shade val="50000"/>
+              </a:schemeClr>
+            </a:lnRef>
+            <a:fillRef idx="1">
+              <a:schemeClr val="accent1"/>
+            </a:fillRef>
+            <a:effectRef idx="0">
+              <a:schemeClr val="accent1"/>
+            </a:effectRef>
+            <a:fontRef idx="minor">
+              <a:schemeClr val="lt1"/>
+            </a:fontRef>
+          </p:style>
+          <p:txBody>
+            <a:bodyPr lIns="502920" tIns="91440"/>
+            <a:lstStyle/>
+            <a:p>
+              <a:pPr eaLnBrk="1" fontAlgn="auto" hangingPunct="1">
+                <a:spcBef>
+                  <a:spcPts val="0"/>
+                </a:spcBef>
+                <a:spcAft>
+                  <a:spcPts val="0"/>
+                </a:spcAft>
+                <a:defRPr/>
+              </a:pPr>
+              <a:r>
+                <a:rPr lang="en-US" sz="1200" dirty="0">
+                  <a:ln w="0"/>
+                  <a:solidFill>
+                    <a:srgbClr val="1E8900"/>
+                  </a:solidFill>
+                  <a:latin typeface="Arial" panose="020B0604020202020204" pitchFamily="34" charset="0"/>
+                  <a:cs typeface="Arial" panose="020B0604020202020204" pitchFamily="34" charset="0"/>
+                </a:rPr>
+                <a:t>VPC</a:t>
+              </a:r>
+            </a:p>
+          </p:txBody>
+        </p:sp>
+        <p:pic>
+          <p:nvPicPr>
+            <p:cNvPr id="17" name="Graphic 16">
+              <a:extLst>
+                <a:ext uri="{FF2B5EF4-FFF2-40B4-BE49-F238E27FC236}">
+                  <a16:creationId xmlns:a16="http://schemas.microsoft.com/office/drawing/2014/main" id="{4AAEDDCD-B4BB-ABF9-C02A-A3953BB48FD5}"/>
+                </a:ext>
+              </a:extLst>
+            </p:cNvPr>
+            <p:cNvPicPr>
+              <a:picLocks noChangeAspect="1"/>
+            </p:cNvPicPr>
+            <p:nvPr/>
+          </p:nvPicPr>
+          <p:blipFill>
+            <a:blip r:embed="rId8">
+              <a:extLst>
+                <a:ext uri="{96DAC541-7B7A-43D3-8B79-37D633B846F1}">
+                  <asvg:svgBlip xmlns:asvg="http://schemas.microsoft.com/office/drawing/2016/SVG/main" r:embed="rId9"/>
+                </a:ext>
+              </a:extLst>
+            </a:blip>
+            <a:stretch>
+              <a:fillRect/>
+            </a:stretch>
+          </p:blipFill>
+          <p:spPr>
+            <a:xfrm>
+              <a:off x="5529549" y="5522336"/>
+              <a:ext cx="381000" cy="381000"/>
+            </a:xfrm>
+            <a:prstGeom prst="rect">
+              <a:avLst/>
+            </a:prstGeom>
+          </p:spPr>
+        </p:pic>
+      </p:grpSp>
+      <p:sp>
+        <p:nvSpPr>
+          <p:cNvPr id="2" name="Rectangle 1">
+            <a:extLst>
+              <a:ext uri="{FF2B5EF4-FFF2-40B4-BE49-F238E27FC236}">
+                <a16:creationId xmlns:a16="http://schemas.microsoft.com/office/drawing/2014/main" id="{E044A3F0-5F49-F266-D69E-7D81FD9568BB}"/>
+              </a:ext>
+            </a:extLst>
+          </p:cNvPr>
+          <p:cNvSpPr/>
+          <p:nvPr/>
+        </p:nvSpPr>
+        <p:spPr>
+          <a:xfrm>
+            <a:off x="515108" y="1369457"/>
+            <a:ext cx="2246753" cy="3230535"/>
+          </a:xfrm>
+          <a:prstGeom prst="rect">
+            <a:avLst/>
+          </a:prstGeom>
+          <a:noFill/>
+          <a:ln w="12700">
+            <a:solidFill>
+              <a:srgbClr val="5B9CD5"/>
+            </a:solidFill>
+            <a:prstDash val="dash"/>
+          </a:ln>
+        </p:spPr>
+        <p:style>
+          <a:lnRef idx="2">
+            <a:schemeClr val="accent1">
+              <a:shade val="50000"/>
+            </a:schemeClr>
+          </a:lnRef>
+          <a:fillRef idx="1">
+            <a:schemeClr val="accent1"/>
+          </a:fillRef>
+          <a:effectRef idx="0">
+            <a:schemeClr val="accent1"/>
+          </a:effectRef>
+          <a:fontRef idx="minor">
+            <a:schemeClr val="lt1"/>
+          </a:fontRef>
+        </p:style>
+        <p:txBody>
+          <a:bodyPr tIns="91440"/>
+          <a:lstStyle/>
+          <a:p>
+            <a:pPr algn="ctr" eaLnBrk="1" fontAlgn="auto" hangingPunct="1">
+              <a:spcBef>
+                <a:spcPts val="0"/>
+              </a:spcBef>
+              <a:spcAft>
+                <a:spcPts val="0"/>
+              </a:spcAft>
+              <a:defRPr/>
+            </a:pPr>
+            <a:r>
+              <a:rPr lang="en-US" sz="1200" dirty="0">
+                <a:solidFill>
+                  <a:srgbClr val="5B9CD5"/>
+                </a:solidFill>
+                <a:latin typeface="Arial" panose="020B0604020202020204" pitchFamily="34" charset="0"/>
+                <a:cs typeface="Arial" panose="020B0604020202020204" pitchFamily="34" charset="0"/>
+              </a:rPr>
+              <a:t>AZ 1</a:t>
+            </a:r>
+          </a:p>
+        </p:txBody>
+      </p:sp>
+      <p:grpSp>
+        <p:nvGrpSpPr>
+          <p:cNvPr id="3" name="Group 2">
+            <a:extLst>
+              <a:ext uri="{FF2B5EF4-FFF2-40B4-BE49-F238E27FC236}">
+                <a16:creationId xmlns:a16="http://schemas.microsoft.com/office/drawing/2014/main" id="{FCB1C4B4-6B3C-D819-D8A6-F5F1C8DA32F9}"/>
+              </a:ext>
+            </a:extLst>
+          </p:cNvPr>
+          <p:cNvGrpSpPr/>
+          <p:nvPr/>
+        </p:nvGrpSpPr>
+        <p:grpSpPr>
+          <a:xfrm>
+            <a:off x="2970706" y="1703301"/>
+            <a:ext cx="2081467" cy="1371806"/>
+            <a:chOff x="9410350" y="5520748"/>
+            <a:chExt cx="2081467" cy="1371806"/>
+          </a:xfrm>
+        </p:grpSpPr>
+        <p:sp>
+          <p:nvSpPr>
+            <p:cNvPr id="4" name="Rectangle 3">
+              <a:extLst>
+                <a:ext uri="{FF2B5EF4-FFF2-40B4-BE49-F238E27FC236}">
+                  <a16:creationId xmlns:a16="http://schemas.microsoft.com/office/drawing/2014/main" id="{6F1D0325-10CE-AD13-15D9-3BF451CBC653}"/>
+                </a:ext>
+              </a:extLst>
+            </p:cNvPr>
+            <p:cNvSpPr/>
+            <p:nvPr/>
+          </p:nvSpPr>
+          <p:spPr>
+            <a:xfrm>
+              <a:off x="9410350" y="5520748"/>
+              <a:ext cx="2081467" cy="1371806"/>
+            </a:xfrm>
+            <a:prstGeom prst="rect">
+              <a:avLst/>
+            </a:prstGeom>
+            <a:solidFill>
+              <a:srgbClr val="1D8900">
+                <a:alpha val="9804"/>
+              </a:srgbClr>
+            </a:solidFill>
+            <a:ln w="12700">
+              <a:noFill/>
+              <a:prstDash val="dash"/>
+            </a:ln>
+          </p:spPr>
+          <p:style>
+            <a:lnRef idx="2">
+              <a:schemeClr val="accent1">
+                <a:shade val="50000"/>
+              </a:schemeClr>
+            </a:lnRef>
+            <a:fillRef idx="1">
+              <a:schemeClr val="accent1"/>
+            </a:fillRef>
+            <a:effectRef idx="0">
+              <a:schemeClr val="accent1"/>
+            </a:effectRef>
+            <a:fontRef idx="minor">
+              <a:schemeClr val="lt1"/>
+            </a:fontRef>
+          </p:style>
+          <p:txBody>
+            <a:bodyPr lIns="502920"/>
+            <a:lstStyle/>
+            <a:p>
+              <a:pPr eaLnBrk="1" fontAlgn="auto" hangingPunct="1">
+                <a:spcBef>
+                  <a:spcPts val="0"/>
+                </a:spcBef>
+                <a:spcAft>
+                  <a:spcPts val="0"/>
+                </a:spcAft>
+                <a:defRPr/>
+              </a:pPr>
+              <a:r>
+                <a:rPr lang="en-US" sz="1200" dirty="0">
+                  <a:solidFill>
+                    <a:srgbClr val="1E8900"/>
+                  </a:solidFill>
+                  <a:latin typeface="Arial" panose="020B0604020202020204" pitchFamily="34" charset="0"/>
+                  <a:cs typeface="Arial" panose="020B0604020202020204" pitchFamily="34" charset="0"/>
+                </a:rPr>
+                <a:t>Public subnet</a:t>
+              </a:r>
+            </a:p>
+          </p:txBody>
+        </p:sp>
+        <p:pic>
+          <p:nvPicPr>
+            <p:cNvPr id="5" name="Graphic 4">
+              <a:extLst>
+                <a:ext uri="{FF2B5EF4-FFF2-40B4-BE49-F238E27FC236}">
+                  <a16:creationId xmlns:a16="http://schemas.microsoft.com/office/drawing/2014/main" id="{F4AA4CA0-6345-DF83-313D-1EEBBB33817D}"/>
+                </a:ext>
+              </a:extLst>
+            </p:cNvPr>
+            <p:cNvPicPr>
+              <a:picLocks noChangeAspect="1"/>
+            </p:cNvPicPr>
+            <p:nvPr/>
+          </p:nvPicPr>
+          <p:blipFill>
+            <a:blip r:embed="rId2">
+              <a:extLst>
+                <a:ext uri="{96DAC541-7B7A-43D3-8B79-37D633B846F1}">
+                  <asvg:svgBlip xmlns:asvg="http://schemas.microsoft.com/office/drawing/2016/SVG/main" r:embed="rId3"/>
+                </a:ext>
+              </a:extLst>
+            </a:blip>
+            <a:stretch>
+              <a:fillRect/>
+            </a:stretch>
+          </p:blipFill>
+          <p:spPr>
+            <a:xfrm>
+              <a:off x="9410986" y="5522336"/>
+              <a:ext cx="381000" cy="381000"/>
+            </a:xfrm>
+            <a:prstGeom prst="rect">
+              <a:avLst/>
+            </a:prstGeom>
+          </p:spPr>
+        </p:pic>
+      </p:grpSp>
+      <p:grpSp>
+        <p:nvGrpSpPr>
+          <p:cNvPr id="21" name="Group 20">
+            <a:extLst>
+              <a:ext uri="{FF2B5EF4-FFF2-40B4-BE49-F238E27FC236}">
+                <a16:creationId xmlns:a16="http://schemas.microsoft.com/office/drawing/2014/main" id="{F6B08755-AEBE-F44F-5F19-2A2A9CD13A3E}"/>
+              </a:ext>
+            </a:extLst>
+          </p:cNvPr>
+          <p:cNvGrpSpPr/>
+          <p:nvPr/>
+        </p:nvGrpSpPr>
+        <p:grpSpPr>
+          <a:xfrm>
+            <a:off x="2972079" y="3135085"/>
+            <a:ext cx="2080094" cy="1371806"/>
+            <a:chOff x="7463283" y="5520748"/>
+            <a:chExt cx="2080094" cy="1371806"/>
+          </a:xfrm>
+        </p:grpSpPr>
+        <p:sp>
+          <p:nvSpPr>
+            <p:cNvPr id="42" name="Rectangle 41">
+              <a:extLst>
+                <a:ext uri="{FF2B5EF4-FFF2-40B4-BE49-F238E27FC236}">
+                  <a16:creationId xmlns:a16="http://schemas.microsoft.com/office/drawing/2014/main" id="{BF253BC1-709D-7956-4C32-BF5158AF49F0}"/>
+                </a:ext>
+              </a:extLst>
+            </p:cNvPr>
+            <p:cNvSpPr/>
+            <p:nvPr/>
+          </p:nvSpPr>
+          <p:spPr>
+            <a:xfrm>
+              <a:off x="7463283" y="5520748"/>
+              <a:ext cx="2080094" cy="1371806"/>
+            </a:xfrm>
+            <a:prstGeom prst="rect">
+              <a:avLst/>
+            </a:prstGeom>
+            <a:solidFill>
+              <a:srgbClr val="007CBC">
+                <a:alpha val="9804"/>
+              </a:srgbClr>
+            </a:solidFill>
+            <a:ln w="12700">
+              <a:noFill/>
+              <a:prstDash val="dash"/>
+            </a:ln>
+          </p:spPr>
+          <p:style>
+            <a:lnRef idx="2">
+              <a:schemeClr val="accent1">
+                <a:shade val="50000"/>
+              </a:schemeClr>
+            </a:lnRef>
+            <a:fillRef idx="1">
+              <a:schemeClr val="accent1"/>
+            </a:fillRef>
+            <a:effectRef idx="0">
+              <a:schemeClr val="accent1"/>
+            </a:effectRef>
+            <a:fontRef idx="minor">
+              <a:schemeClr val="lt1"/>
+            </a:fontRef>
+          </p:style>
+          <p:txBody>
+            <a:bodyPr lIns="502920"/>
+            <a:lstStyle/>
+            <a:p>
+              <a:pPr eaLnBrk="1" fontAlgn="auto" hangingPunct="1">
+                <a:spcBef>
+                  <a:spcPts val="0"/>
+                </a:spcBef>
+                <a:spcAft>
+                  <a:spcPts val="0"/>
+                </a:spcAft>
+                <a:defRPr/>
+              </a:pPr>
+              <a:r>
+                <a:rPr lang="en-US" sz="1200" dirty="0">
+                  <a:solidFill>
+                    <a:srgbClr val="5B9CD5"/>
+                  </a:solidFill>
+                  <a:latin typeface="Arial" panose="020B0604020202020204" pitchFamily="34" charset="0"/>
+                  <a:cs typeface="Arial" panose="020B0604020202020204" pitchFamily="34" charset="0"/>
+                </a:rPr>
+                <a:t>Private subnet</a:t>
+              </a:r>
+            </a:p>
+          </p:txBody>
+        </p:sp>
+        <p:pic>
+          <p:nvPicPr>
+            <p:cNvPr id="47" name="Graphic 46">
+              <a:extLst>
+                <a:ext uri="{FF2B5EF4-FFF2-40B4-BE49-F238E27FC236}">
+                  <a16:creationId xmlns:a16="http://schemas.microsoft.com/office/drawing/2014/main" id="{BDBF10D0-3216-F4C0-E832-9A1F98C92647}"/>
+                </a:ext>
+              </a:extLst>
+            </p:cNvPr>
+            <p:cNvPicPr>
+              <a:picLocks noChangeAspect="1"/>
+            </p:cNvPicPr>
+            <p:nvPr/>
+          </p:nvPicPr>
+          <p:blipFill>
+            <a:blip r:embed="rId4">
+              <a:extLst>
+                <a:ext uri="{96DAC541-7B7A-43D3-8B79-37D633B846F1}">
+                  <asvg:svgBlip xmlns:asvg="http://schemas.microsoft.com/office/drawing/2016/SVG/main" r:embed="rId5"/>
+                </a:ext>
+              </a:extLst>
+            </a:blip>
+            <a:stretch>
+              <a:fillRect/>
+            </a:stretch>
+          </p:blipFill>
+          <p:spPr>
+            <a:xfrm>
+              <a:off x="7468045" y="5522336"/>
+              <a:ext cx="381000" cy="381000"/>
+            </a:xfrm>
+            <a:prstGeom prst="rect">
+              <a:avLst/>
+            </a:prstGeom>
+          </p:spPr>
+        </p:pic>
+      </p:grpSp>
+      <p:sp>
+        <p:nvSpPr>
+          <p:cNvPr id="48" name="Rectangle 47">
+            <a:extLst>
+              <a:ext uri="{FF2B5EF4-FFF2-40B4-BE49-F238E27FC236}">
+                <a16:creationId xmlns:a16="http://schemas.microsoft.com/office/drawing/2014/main" id="{2F1ED853-0DA0-7CA1-6F4B-F91444B0E974}"/>
+              </a:ext>
+            </a:extLst>
+          </p:cNvPr>
+          <p:cNvSpPr/>
+          <p:nvPr/>
+        </p:nvSpPr>
+        <p:spPr>
+          <a:xfrm>
+            <a:off x="2875753" y="1369457"/>
+            <a:ext cx="2246753" cy="3230535"/>
+          </a:xfrm>
+          <a:prstGeom prst="rect">
+            <a:avLst/>
+          </a:prstGeom>
+          <a:noFill/>
+          <a:ln w="12700">
+            <a:solidFill>
+              <a:srgbClr val="5B9CD5"/>
+            </a:solidFill>
+            <a:prstDash val="dash"/>
+          </a:ln>
+        </p:spPr>
+        <p:style>
+          <a:lnRef idx="2">
+            <a:schemeClr val="accent1">
+              <a:shade val="50000"/>
+            </a:schemeClr>
+          </a:lnRef>
+          <a:fillRef idx="1">
+            <a:schemeClr val="accent1"/>
+          </a:fillRef>
+          <a:effectRef idx="0">
+            <a:schemeClr val="accent1"/>
+          </a:effectRef>
+          <a:fontRef idx="minor">
+            <a:schemeClr val="lt1"/>
+          </a:fontRef>
+        </p:style>
+        <p:txBody>
+          <a:bodyPr tIns="91440"/>
+          <a:lstStyle/>
+          <a:p>
+            <a:pPr algn="ctr" eaLnBrk="1" fontAlgn="auto" hangingPunct="1">
+              <a:spcBef>
+                <a:spcPts val="0"/>
+              </a:spcBef>
+              <a:spcAft>
+                <a:spcPts val="0"/>
+              </a:spcAft>
+              <a:defRPr/>
+            </a:pPr>
+            <a:r>
+              <a:rPr lang="en-US" sz="1200" dirty="0">
+                <a:solidFill>
+                  <a:srgbClr val="5B9CD5"/>
+                </a:solidFill>
+                <a:latin typeface="Arial" panose="020B0604020202020204" pitchFamily="34" charset="0"/>
+                <a:cs typeface="Arial" panose="020B0604020202020204" pitchFamily="34" charset="0"/>
+              </a:rPr>
+              <a:t>AZ 2</a:t>
+            </a:r>
+          </a:p>
+        </p:txBody>
+      </p:sp>
+      <p:grpSp>
+        <p:nvGrpSpPr>
+          <p:cNvPr id="56" name="Group 55">
+            <a:extLst>
+              <a:ext uri="{FF2B5EF4-FFF2-40B4-BE49-F238E27FC236}">
+                <a16:creationId xmlns:a16="http://schemas.microsoft.com/office/drawing/2014/main" id="{B84F0A69-F509-686B-CCCC-DA24CD6CD957}"/>
+              </a:ext>
+            </a:extLst>
+          </p:cNvPr>
+          <p:cNvGrpSpPr/>
+          <p:nvPr/>
+        </p:nvGrpSpPr>
+        <p:grpSpPr>
+          <a:xfrm>
+            <a:off x="6020169" y="1369457"/>
+            <a:ext cx="2246753" cy="3230535"/>
+            <a:chOff x="5255059" y="1369457"/>
+            <a:chExt cx="2246753" cy="3230535"/>
+          </a:xfrm>
+        </p:grpSpPr>
+        <p:grpSp>
+          <p:nvGrpSpPr>
+            <p:cNvPr id="49" name="Group 48">
+              <a:extLst>
+                <a:ext uri="{FF2B5EF4-FFF2-40B4-BE49-F238E27FC236}">
+                  <a16:creationId xmlns:a16="http://schemas.microsoft.com/office/drawing/2014/main" id="{6D71C6C7-0E00-8350-D898-35080006D6A3}"/>
+                </a:ext>
+              </a:extLst>
+            </p:cNvPr>
+            <p:cNvGrpSpPr/>
+            <p:nvPr/>
+          </p:nvGrpSpPr>
+          <p:grpSpPr>
+            <a:xfrm>
+              <a:off x="5350012" y="1703301"/>
+              <a:ext cx="2081467" cy="1371806"/>
+              <a:chOff x="9410350" y="5520748"/>
+              <a:chExt cx="2081467" cy="1371806"/>
+            </a:xfrm>
+          </p:grpSpPr>
+          <p:sp>
+            <p:nvSpPr>
+              <p:cNvPr id="50" name="Rectangle 49">
+                <a:extLst>
+                  <a:ext uri="{FF2B5EF4-FFF2-40B4-BE49-F238E27FC236}">
+                    <a16:creationId xmlns:a16="http://schemas.microsoft.com/office/drawing/2014/main" id="{F42C9B72-41F6-B9FB-F702-F70C1269756F}"/>
+                  </a:ext>
+                </a:extLst>
+              </p:cNvPr>
+              <p:cNvSpPr/>
+              <p:nvPr/>
+            </p:nvSpPr>
+            <p:spPr>
+              <a:xfrm>
+                <a:off x="9410350" y="5520748"/>
+                <a:ext cx="2081467" cy="1371806"/>
+              </a:xfrm>
+              <a:prstGeom prst="rect">
+                <a:avLst/>
+              </a:prstGeom>
+              <a:solidFill>
+                <a:srgbClr val="1D8900">
+                  <a:alpha val="9804"/>
+                </a:srgbClr>
+              </a:solidFill>
+              <a:ln w="12700">
+                <a:noFill/>
+                <a:prstDash val="dash"/>
+              </a:ln>
+            </p:spPr>
+            <p:style>
+              <a:lnRef idx="2">
+                <a:schemeClr val="accent1">
+                  <a:shade val="50000"/>
+                </a:schemeClr>
+              </a:lnRef>
+              <a:fillRef idx="1">
+                <a:schemeClr val="accent1"/>
+              </a:fillRef>
+              <a:effectRef idx="0">
+                <a:schemeClr val="accent1"/>
+              </a:effectRef>
+              <a:fontRef idx="minor">
+                <a:schemeClr val="lt1"/>
+              </a:fontRef>
+            </p:style>
+            <p:txBody>
+              <a:bodyPr lIns="502920"/>
+              <a:lstStyle/>
+              <a:p>
+                <a:pPr eaLnBrk="1" fontAlgn="auto" hangingPunct="1">
+                  <a:spcBef>
+                    <a:spcPts val="0"/>
+                  </a:spcBef>
+                  <a:spcAft>
+                    <a:spcPts val="0"/>
+                  </a:spcAft>
+                  <a:defRPr/>
+                </a:pPr>
+                <a:r>
+                  <a:rPr lang="en-US" sz="1200" dirty="0">
+                    <a:solidFill>
+                      <a:srgbClr val="1E8900"/>
+                    </a:solidFill>
+                    <a:latin typeface="Arial" panose="020B0604020202020204" pitchFamily="34" charset="0"/>
+                    <a:cs typeface="Arial" panose="020B0604020202020204" pitchFamily="34" charset="0"/>
+                  </a:rPr>
+                  <a:t>Public subnet</a:t>
+                </a:r>
+              </a:p>
+            </p:txBody>
+          </p:sp>
+          <p:pic>
+            <p:nvPicPr>
+              <p:cNvPr id="51" name="Graphic 50">
+                <a:extLst>
+                  <a:ext uri="{FF2B5EF4-FFF2-40B4-BE49-F238E27FC236}">
+                    <a16:creationId xmlns:a16="http://schemas.microsoft.com/office/drawing/2014/main" id="{CC1DB76F-B656-AEFD-0951-3B1300241C40}"/>
+                  </a:ext>
+                </a:extLst>
+              </p:cNvPr>
+              <p:cNvPicPr>
+                <a:picLocks noChangeAspect="1"/>
+              </p:cNvPicPr>
+              <p:nvPr/>
+            </p:nvPicPr>
+            <p:blipFill>
+              <a:blip r:embed="rId2">
+                <a:extLst>
+                  <a:ext uri="{96DAC541-7B7A-43D3-8B79-37D633B846F1}">
+                    <asvg:svgBlip xmlns:asvg="http://schemas.microsoft.com/office/drawing/2016/SVG/main" r:embed="rId3"/>
+                  </a:ext>
+                </a:extLst>
+              </a:blip>
+              <a:stretch>
+                <a:fillRect/>
+              </a:stretch>
+            </p:blipFill>
+            <p:spPr>
+              <a:xfrm>
+                <a:off x="9410986" y="5522336"/>
+                <a:ext cx="381000" cy="381000"/>
+              </a:xfrm>
+              <a:prstGeom prst="rect">
+                <a:avLst/>
+              </a:prstGeom>
+            </p:spPr>
+          </p:pic>
+        </p:grpSp>
+        <p:grpSp>
+          <p:nvGrpSpPr>
+            <p:cNvPr id="52" name="Group 51">
+              <a:extLst>
+                <a:ext uri="{FF2B5EF4-FFF2-40B4-BE49-F238E27FC236}">
+                  <a16:creationId xmlns:a16="http://schemas.microsoft.com/office/drawing/2014/main" id="{1E819995-5E79-9B86-AAF2-26E9ED2FB29C}"/>
+                </a:ext>
+              </a:extLst>
+            </p:cNvPr>
+            <p:cNvGrpSpPr/>
+            <p:nvPr/>
+          </p:nvGrpSpPr>
+          <p:grpSpPr>
+            <a:xfrm>
+              <a:off x="5351385" y="3135085"/>
+              <a:ext cx="2080094" cy="1371806"/>
+              <a:chOff x="7463283" y="5520748"/>
+              <a:chExt cx="2080094" cy="1371806"/>
+            </a:xfrm>
+          </p:grpSpPr>
+          <p:sp>
+            <p:nvSpPr>
+              <p:cNvPr id="53" name="Rectangle 52">
+                <a:extLst>
+                  <a:ext uri="{FF2B5EF4-FFF2-40B4-BE49-F238E27FC236}">
+                    <a16:creationId xmlns:a16="http://schemas.microsoft.com/office/drawing/2014/main" id="{241E4190-8F31-D14F-6837-B879FBF2801C}"/>
+                  </a:ext>
+                </a:extLst>
+              </p:cNvPr>
+              <p:cNvSpPr/>
+              <p:nvPr/>
+            </p:nvSpPr>
+            <p:spPr>
+              <a:xfrm>
+                <a:off x="7463283" y="5520748"/>
+                <a:ext cx="2080094" cy="1371806"/>
+              </a:xfrm>
+              <a:prstGeom prst="rect">
+                <a:avLst/>
+              </a:prstGeom>
+              <a:solidFill>
+                <a:srgbClr val="007CBC">
+                  <a:alpha val="9804"/>
+                </a:srgbClr>
+              </a:solidFill>
+              <a:ln w="12700">
+                <a:noFill/>
+                <a:prstDash val="dash"/>
+              </a:ln>
+            </p:spPr>
+            <p:style>
+              <a:lnRef idx="2">
+                <a:schemeClr val="accent1">
+                  <a:shade val="50000"/>
+                </a:schemeClr>
+              </a:lnRef>
+              <a:fillRef idx="1">
+                <a:schemeClr val="accent1"/>
+              </a:fillRef>
+              <a:effectRef idx="0">
+                <a:schemeClr val="accent1"/>
+              </a:effectRef>
+              <a:fontRef idx="minor">
+                <a:schemeClr val="lt1"/>
+              </a:fontRef>
+            </p:style>
+            <p:txBody>
+              <a:bodyPr lIns="502920"/>
+              <a:lstStyle/>
+              <a:p>
+                <a:pPr eaLnBrk="1" fontAlgn="auto" hangingPunct="1">
+                  <a:spcBef>
+                    <a:spcPts val="0"/>
+                  </a:spcBef>
+                  <a:spcAft>
+                    <a:spcPts val="0"/>
+                  </a:spcAft>
+                  <a:defRPr/>
+                </a:pPr>
+                <a:r>
+                  <a:rPr lang="en-US" sz="1200" dirty="0">
+                    <a:solidFill>
+                      <a:srgbClr val="5B9CD5"/>
+                    </a:solidFill>
+                    <a:latin typeface="Arial" panose="020B0604020202020204" pitchFamily="34" charset="0"/>
+                    <a:cs typeface="Arial" panose="020B0604020202020204" pitchFamily="34" charset="0"/>
+                  </a:rPr>
+                  <a:t>Private subnet</a:t>
+                </a:r>
+              </a:p>
+            </p:txBody>
+          </p:sp>
+          <p:pic>
+            <p:nvPicPr>
+              <p:cNvPr id="54" name="Graphic 53">
+                <a:extLst>
+                  <a:ext uri="{FF2B5EF4-FFF2-40B4-BE49-F238E27FC236}">
+                    <a16:creationId xmlns:a16="http://schemas.microsoft.com/office/drawing/2014/main" id="{063B0B6B-8291-2FB4-236D-8B61C664A0AA}"/>
+                  </a:ext>
+                </a:extLst>
+              </p:cNvPr>
+              <p:cNvPicPr>
+                <a:picLocks noChangeAspect="1"/>
+              </p:cNvPicPr>
+              <p:nvPr/>
+            </p:nvPicPr>
+            <p:blipFill>
+              <a:blip r:embed="rId4">
+                <a:extLst>
+                  <a:ext uri="{96DAC541-7B7A-43D3-8B79-37D633B846F1}">
+                    <asvg:svgBlip xmlns:asvg="http://schemas.microsoft.com/office/drawing/2016/SVG/main" r:embed="rId5"/>
+                  </a:ext>
+                </a:extLst>
+              </a:blip>
+              <a:stretch>
+                <a:fillRect/>
+              </a:stretch>
+            </p:blipFill>
+            <p:spPr>
+              <a:xfrm>
+                <a:off x="7468045" y="5522336"/>
+                <a:ext cx="381000" cy="381000"/>
+              </a:xfrm>
+              <a:prstGeom prst="rect">
+                <a:avLst/>
+              </a:prstGeom>
+            </p:spPr>
+          </p:pic>
+        </p:grpSp>
+        <p:sp>
+          <p:nvSpPr>
+            <p:cNvPr id="55" name="Rectangle 54">
+              <a:extLst>
+                <a:ext uri="{FF2B5EF4-FFF2-40B4-BE49-F238E27FC236}">
+                  <a16:creationId xmlns:a16="http://schemas.microsoft.com/office/drawing/2014/main" id="{2EDCFF3E-BD21-1ECF-9985-78D27A497F10}"/>
+                </a:ext>
+              </a:extLst>
+            </p:cNvPr>
+            <p:cNvSpPr/>
+            <p:nvPr/>
+          </p:nvSpPr>
+          <p:spPr>
+            <a:xfrm>
+              <a:off x="5255059" y="1369457"/>
+              <a:ext cx="2246753" cy="3230535"/>
+            </a:xfrm>
+            <a:prstGeom prst="rect">
+              <a:avLst/>
+            </a:prstGeom>
+            <a:noFill/>
+            <a:ln w="12700">
+              <a:solidFill>
+                <a:srgbClr val="5B9CD5"/>
+              </a:solidFill>
+              <a:prstDash val="dash"/>
+            </a:ln>
+          </p:spPr>
+          <p:style>
+            <a:lnRef idx="2">
+              <a:schemeClr val="accent1">
+                <a:shade val="50000"/>
+              </a:schemeClr>
+            </a:lnRef>
+            <a:fillRef idx="1">
+              <a:schemeClr val="accent1"/>
+            </a:fillRef>
+            <a:effectRef idx="0">
+              <a:schemeClr val="accent1"/>
+            </a:effectRef>
+            <a:fontRef idx="minor">
+              <a:schemeClr val="lt1"/>
+            </a:fontRef>
+          </p:style>
+          <p:txBody>
+            <a:bodyPr tIns="91440"/>
+            <a:lstStyle/>
+            <a:p>
+              <a:pPr algn="ctr" eaLnBrk="1" fontAlgn="auto" hangingPunct="1">
+                <a:spcBef>
+                  <a:spcPts val="0"/>
+                </a:spcBef>
+                <a:spcAft>
+                  <a:spcPts val="0"/>
+                </a:spcAft>
+                <a:defRPr/>
+              </a:pPr>
+              <a:r>
+                <a:rPr lang="en-US" sz="1200" dirty="0">
+                  <a:solidFill>
+                    <a:srgbClr val="5B9CD5"/>
+                  </a:solidFill>
+                  <a:latin typeface="Arial" panose="020B0604020202020204" pitchFamily="34" charset="0"/>
+                  <a:cs typeface="Arial" panose="020B0604020202020204" pitchFamily="34" charset="0"/>
+                </a:rPr>
+                <a:t>AZ </a:t>
+              </a:r>
+              <a:r>
+                <a:rPr lang="en-US" sz="1200" i="1" dirty="0">
+                  <a:solidFill>
+                    <a:srgbClr val="5B9CD5"/>
+                  </a:solidFill>
+                  <a:latin typeface="Arial" panose="020B0604020202020204" pitchFamily="34" charset="0"/>
+                  <a:cs typeface="Arial" panose="020B0604020202020204" pitchFamily="34" charset="0"/>
+                </a:rPr>
+                <a:t>N</a:t>
+              </a:r>
+            </a:p>
+          </p:txBody>
+        </p:sp>
+      </p:grpSp>
+    </p:spTree>
+    <p:extLst>
+      <p:ext uri="{BB962C8B-B14F-4D97-AF65-F5344CB8AC3E}">
+        <p14:creationId xmlns:p14="http://schemas.microsoft.com/office/powerpoint/2010/main" val="4050025171"/>
+      </p:ext>
+    </p:extLst>
+  </p:cSld>
+  <p:clrMapOvr>
+    <a:masterClrMapping/>
+  </p:clrMapOvr>
+</p:sld>
+</file>
+
 <file path=ppt/theme/theme1.xml><?xml version="1.0" encoding="utf-8"?>
 <a:theme xmlns:a="http://schemas.openxmlformats.org/drawingml/2006/main" name="Office Theme">
   <a:themeElements>

</xml_diff>